<commit_message>
added images and changed return statement
</commit_message>
<xml_diff>
--- a/Валидатор почты.pptx
+++ b/Валидатор почты.pptx
@@ -3146,7 +3146,7 @@
           <a:bodyPr lIns="0" rIns="0" tIns="0" bIns="0"/>
           <a:p>
             <a:pPr algn="r"/>
-            <a:fld id="{28F6B661-638E-46C0-B162-F4A30F4896DC}" type="slidenum">
+            <a:fld id="{0C06DB08-9CE2-401A-92D7-0DEBA29BD89B}" type="slidenum">
               <a:rPr b="0" lang="en-US" sz="1400" spc="-1" strike="noStrike">
                 <a:latin typeface="Times New Roman"/>
               </a:rPr>
@@ -3553,7 +3553,7 @@
               <a:rPr b="0" lang="en-US" sz="1400" spc="-1" strike="noStrike">
                 <a:latin typeface="Times New Roman"/>
               </a:rPr>
-              <a:t> </a:t>
+              <a:t>&lt;date/time&gt;</a:t>
             </a:r>
             <a:endParaRPr b="0" lang="en-US" sz="1400" spc="-1" strike="noStrike">
               <a:latin typeface="Times New Roman"/>
@@ -3588,7 +3588,7 @@
               <a:rPr b="0" lang="en-US" sz="1400" spc="-1" strike="noStrike">
                 <a:latin typeface="Times New Roman"/>
               </a:rPr>
-              <a:t> </a:t>
+              <a:t>&lt;footer&gt;</a:t>
             </a:r>
             <a:endParaRPr b="0" lang="en-US" sz="1400" spc="-1" strike="noStrike">
               <a:latin typeface="Times New Roman"/>
@@ -3619,11 +3619,11 @@
           <a:bodyPr lIns="0" rIns="0" tIns="0" bIns="0"/>
           <a:p>
             <a:pPr algn="r"/>
-            <a:fld id="{4CF4DF4B-3EE3-4419-AF14-FA6D27391C7C}" type="slidenum">
+            <a:fld id="{303ADB84-4760-4939-BF98-9B440F2754B7}" type="slidenum">
               <a:rPr b="0" lang="en-US" sz="1400" spc="-1" strike="noStrike">
                 <a:latin typeface="Times New Roman"/>
               </a:rPr>
-              <a:t>1</a:t>
+              <a:t>&lt;number&gt;</a:t>
             </a:fld>
             <a:endParaRPr b="0" lang="en-US" sz="1400" spc="-1" strike="noStrike">
               <a:latin typeface="Times New Roman"/>
@@ -3711,33 +3711,6 @@
       </p:sp>
     </p:spTree>
   </p:cSld>
-  <p:timing>
-    <p:tnLst>
-      <p:par>
-        <p:cTn id="1" dur="indefinite" restart="never" nodeType="tmRoot">
-          <p:childTnLst>
-            <p:seq>
-              <p:cTn id="2" dur="indefinite" nodeType="mainSeq"/>
-              <p:prevCondLst>
-                <p:cond delay="0" evt="onPrev">
-                  <p:tgtEl>
-                    <p:sldTgt/>
-                  </p:tgtEl>
-                </p:cond>
-              </p:prevCondLst>
-              <p:nextCondLst>
-                <p:cond delay="0" evt="onNext">
-                  <p:tgtEl>
-                    <p:sldTgt/>
-                  </p:tgtEl>
-                </p:cond>
-              </p:nextCondLst>
-            </p:seq>
-          </p:childTnLst>
-        </p:cTn>
-      </p:par>
-    </p:tnLst>
-  </p:timing>
 </p:sld>
 </file>
 
@@ -3760,7 +3733,7 @@
       </p:grpSpPr>
       <p:sp>
         <p:nvSpPr>
-          <p:cNvPr id="102" name="TextShape 1"/>
+          <p:cNvPr id="105" name="TextShape 1"/>
           <p:cNvSpPr txBox="1"/>
           <p:nvPr/>
         </p:nvSpPr>
@@ -3801,7 +3774,7 @@
       </p:sp>
       <p:sp>
         <p:nvSpPr>
-          <p:cNvPr id="103" name="TextShape 2"/>
+          <p:cNvPr id="106" name="TextShape 2"/>
           <p:cNvSpPr txBox="1"/>
           <p:nvPr/>
         </p:nvSpPr>
@@ -4029,33 +4002,6 @@
       </p:sp>
     </p:spTree>
   </p:cSld>
-  <p:timing>
-    <p:tnLst>
-      <p:par>
-        <p:cTn id="19" dur="indefinite" restart="never" nodeType="tmRoot">
-          <p:childTnLst>
-            <p:seq>
-              <p:cTn id="20" dur="indefinite" nodeType="mainSeq"/>
-              <p:prevCondLst>
-                <p:cond delay="0" evt="onPrev">
-                  <p:tgtEl>
-                    <p:sldTgt/>
-                  </p:tgtEl>
-                </p:cond>
-              </p:prevCondLst>
-              <p:nextCondLst>
-                <p:cond delay="0" evt="onNext">
-                  <p:tgtEl>
-                    <p:sldTgt/>
-                  </p:tgtEl>
-                </p:cond>
-              </p:nextCondLst>
-            </p:seq>
-          </p:childTnLst>
-        </p:cTn>
-      </p:par>
-    </p:tnLst>
-  </p:timing>
 </p:sld>
 </file>
 
@@ -4233,35 +4179,31 @@
           </a:p>
         </p:txBody>
       </p:sp>
+      <p:pic>
+        <p:nvPicPr>
+          <p:cNvPr id="88" name="" descr=""/>
+          <p:cNvPicPr/>
+          <p:nvPr/>
+        </p:nvPicPr>
+        <p:blipFill>
+          <a:blip r:embed="rId1"/>
+          <a:stretch/>
+        </p:blipFill>
+        <p:spPr>
+          <a:xfrm>
+            <a:off x="4023360" y="4480560"/>
+            <a:ext cx="1881000" cy="1881000"/>
+          </a:xfrm>
+          <a:prstGeom prst="rect">
+            <a:avLst/>
+          </a:prstGeom>
+          <a:ln>
+            <a:noFill/>
+          </a:ln>
+        </p:spPr>
+      </p:pic>
     </p:spTree>
   </p:cSld>
-  <p:timing>
-    <p:tnLst>
-      <p:par>
-        <p:cTn id="3" dur="indefinite" restart="never" nodeType="tmRoot">
-          <p:childTnLst>
-            <p:seq>
-              <p:cTn id="4" dur="indefinite" nodeType="mainSeq"/>
-              <p:prevCondLst>
-                <p:cond delay="0" evt="onPrev">
-                  <p:tgtEl>
-                    <p:sldTgt/>
-                  </p:tgtEl>
-                </p:cond>
-              </p:prevCondLst>
-              <p:nextCondLst>
-                <p:cond delay="0" evt="onNext">
-                  <p:tgtEl>
-                    <p:sldTgt/>
-                  </p:tgtEl>
-                </p:cond>
-              </p:nextCondLst>
-            </p:seq>
-          </p:childTnLst>
-        </p:cTn>
-      </p:par>
-    </p:tnLst>
-  </p:timing>
 </p:sld>
 </file>
 
@@ -4284,7 +4226,7 @@
       </p:grpSpPr>
       <p:sp>
         <p:nvSpPr>
-          <p:cNvPr id="88" name="TextShape 1"/>
+          <p:cNvPr id="89" name="TextShape 1"/>
           <p:cNvSpPr txBox="1"/>
           <p:nvPr/>
         </p:nvSpPr>
@@ -4325,7 +4267,7 @@
       </p:sp>
       <p:sp>
         <p:nvSpPr>
-          <p:cNvPr id="89" name="TextShape 2"/>
+          <p:cNvPr id="90" name="TextShape 2"/>
           <p:cNvSpPr txBox="1"/>
           <p:nvPr/>
         </p:nvSpPr>
@@ -4460,33 +4402,6 @@
       </p:sp>
     </p:spTree>
   </p:cSld>
-  <p:timing>
-    <p:tnLst>
-      <p:par>
-        <p:cTn id="5" dur="indefinite" restart="never" nodeType="tmRoot">
-          <p:childTnLst>
-            <p:seq>
-              <p:cTn id="6" dur="indefinite" nodeType="mainSeq"/>
-              <p:prevCondLst>
-                <p:cond delay="0" evt="onPrev">
-                  <p:tgtEl>
-                    <p:sldTgt/>
-                  </p:tgtEl>
-                </p:cond>
-              </p:prevCondLst>
-              <p:nextCondLst>
-                <p:cond delay="0" evt="onNext">
-                  <p:tgtEl>
-                    <p:sldTgt/>
-                  </p:tgtEl>
-                </p:cond>
-              </p:nextCondLst>
-            </p:seq>
-          </p:childTnLst>
-        </p:cTn>
-      </p:par>
-    </p:tnLst>
-  </p:timing>
 </p:sld>
 </file>
 
@@ -4509,7 +4424,7 @@
       </p:grpSpPr>
       <p:sp>
         <p:nvSpPr>
-          <p:cNvPr id="90" name="TextShape 1"/>
+          <p:cNvPr id="91" name="TextShape 1"/>
           <p:cNvSpPr txBox="1"/>
           <p:nvPr/>
         </p:nvSpPr>
@@ -4550,7 +4465,7 @@
       </p:sp>
       <p:sp>
         <p:nvSpPr>
-          <p:cNvPr id="91" name="TextShape 2"/>
+          <p:cNvPr id="92" name="TextShape 2"/>
           <p:cNvSpPr txBox="1"/>
           <p:nvPr/>
         </p:nvSpPr>
@@ -4781,33 +4696,6 @@
       </p:sp>
     </p:spTree>
   </p:cSld>
-  <p:timing>
-    <p:tnLst>
-      <p:par>
-        <p:cTn id="7" dur="indefinite" restart="never" nodeType="tmRoot">
-          <p:childTnLst>
-            <p:seq>
-              <p:cTn id="8" dur="indefinite" nodeType="mainSeq"/>
-              <p:prevCondLst>
-                <p:cond delay="0" evt="onPrev">
-                  <p:tgtEl>
-                    <p:sldTgt/>
-                  </p:tgtEl>
-                </p:cond>
-              </p:prevCondLst>
-              <p:nextCondLst>
-                <p:cond delay="0" evt="onNext">
-                  <p:tgtEl>
-                    <p:sldTgt/>
-                  </p:tgtEl>
-                </p:cond>
-              </p:nextCondLst>
-            </p:seq>
-          </p:childTnLst>
-        </p:cTn>
-      </p:par>
-    </p:tnLst>
-  </p:timing>
 </p:sld>
 </file>
 
@@ -4830,7 +4718,7 @@
       </p:grpSpPr>
       <p:sp>
         <p:nvSpPr>
-          <p:cNvPr id="92" name="TextShape 1"/>
+          <p:cNvPr id="93" name="TextShape 1"/>
           <p:cNvSpPr txBox="1"/>
           <p:nvPr/>
         </p:nvSpPr>
@@ -4871,7 +4759,7 @@
       </p:sp>
       <p:sp>
         <p:nvSpPr>
-          <p:cNvPr id="93" name="TextShape 2"/>
+          <p:cNvPr id="94" name="TextShape 2"/>
           <p:cNvSpPr txBox="1"/>
           <p:nvPr/>
         </p:nvSpPr>
@@ -4911,7 +4799,7 @@
               </a:rPr>
               <a:t>&lt;локальная часть&gt;@&lt;доменная часть&gt;</a:t>
             </a:r>
-            <a:endParaRPr b="0" i="1" lang="en-US" sz="2800" spc="-1" strike="noStrike">
+            <a:endParaRPr b="0" lang="en-US" sz="2800" spc="-1" strike="noStrike">
               <a:solidFill>
                 <a:srgbClr val="0066cc"/>
               </a:solidFill>
@@ -4939,7 +4827,7 @@
               </a:rPr>
               <a:t>В локальной части допускаются все латинские буквы и цифры, а также спец символы -_.</a:t>
             </a:r>
-            <a:endParaRPr b="0" i="1" lang="en-US" sz="2800" spc="-1" strike="noStrike">
+            <a:endParaRPr b="0" lang="en-US" sz="2800" spc="-1" strike="noStrike">
               <a:solidFill>
                 <a:srgbClr val="0066cc"/>
               </a:solidFill>
@@ -4976,7 +4864,7 @@
               </a:rPr>
               <a:t>допускаются все латинские буквы и цифры, а также спец символы -_.</a:t>
             </a:r>
-            <a:endParaRPr b="0" i="1" lang="en-US" sz="2800" spc="-1" strike="noStrike">
+            <a:endParaRPr b="0" lang="en-US" sz="2800" spc="-1" strike="noStrike">
               <a:solidFill>
                 <a:srgbClr val="0066cc"/>
               </a:solidFill>
@@ -5004,7 +4892,7 @@
               </a:rPr>
               <a:t>Длина последнего домена после точки должна быть от двух символов и содержать только буквы</a:t>
             </a:r>
-            <a:endParaRPr b="0" i="1" lang="en-US" sz="2800" spc="-1" strike="noStrike">
+            <a:endParaRPr b="0" lang="en-US" sz="2800" spc="-1" strike="noStrike">
               <a:solidFill>
                 <a:srgbClr val="0066cc"/>
               </a:solidFill>
@@ -5015,33 +4903,6 @@
       </p:sp>
     </p:spTree>
   </p:cSld>
-  <p:timing>
-    <p:tnLst>
-      <p:par>
-        <p:cTn id="9" dur="indefinite" restart="never" nodeType="tmRoot">
-          <p:childTnLst>
-            <p:seq>
-              <p:cTn id="10" dur="indefinite" nodeType="mainSeq"/>
-              <p:prevCondLst>
-                <p:cond delay="0" evt="onPrev">
-                  <p:tgtEl>
-                    <p:sldTgt/>
-                  </p:tgtEl>
-                </p:cond>
-              </p:prevCondLst>
-              <p:nextCondLst>
-                <p:cond delay="0" evt="onNext">
-                  <p:tgtEl>
-                    <p:sldTgt/>
-                  </p:tgtEl>
-                </p:cond>
-              </p:nextCondLst>
-            </p:seq>
-          </p:childTnLst>
-        </p:cTn>
-      </p:par>
-    </p:tnLst>
-  </p:timing>
 </p:sld>
 </file>
 
@@ -5064,7 +4925,7 @@
       </p:grpSpPr>
       <p:sp>
         <p:nvSpPr>
-          <p:cNvPr id="94" name="TextShape 1"/>
+          <p:cNvPr id="95" name="TextShape 1"/>
           <p:cNvSpPr txBox="1"/>
           <p:nvPr/>
         </p:nvSpPr>
@@ -5105,7 +4966,7 @@
       </p:sp>
       <p:sp>
         <p:nvSpPr>
-          <p:cNvPr id="95" name="TextShape 2"/>
+          <p:cNvPr id="96" name="TextShape 2"/>
           <p:cNvSpPr txBox="1"/>
           <p:nvPr/>
         </p:nvSpPr>
@@ -5182,35 +5043,54 @@
           </a:p>
         </p:txBody>
       </p:sp>
+      <p:pic>
+        <p:nvPicPr>
+          <p:cNvPr id="97" name="" descr=""/>
+          <p:cNvPicPr/>
+          <p:nvPr/>
+        </p:nvPicPr>
+        <p:blipFill>
+          <a:blip r:embed="rId1"/>
+          <a:stretch/>
+        </p:blipFill>
+        <p:spPr>
+          <a:xfrm>
+            <a:off x="2103120" y="3657600"/>
+            <a:ext cx="1737360" cy="1737360"/>
+          </a:xfrm>
+          <a:prstGeom prst="rect">
+            <a:avLst/>
+          </a:prstGeom>
+          <a:ln>
+            <a:noFill/>
+          </a:ln>
+        </p:spPr>
+      </p:pic>
+      <p:pic>
+        <p:nvPicPr>
+          <p:cNvPr id="98" name="" descr=""/>
+          <p:cNvPicPr/>
+          <p:nvPr/>
+        </p:nvPicPr>
+        <p:blipFill>
+          <a:blip r:embed="rId2"/>
+          <a:stretch/>
+        </p:blipFill>
+        <p:spPr>
+          <a:xfrm>
+            <a:off x="4754880" y="3474720"/>
+            <a:ext cx="2103120" cy="2103120"/>
+          </a:xfrm>
+          <a:prstGeom prst="rect">
+            <a:avLst/>
+          </a:prstGeom>
+          <a:ln>
+            <a:noFill/>
+          </a:ln>
+        </p:spPr>
+      </p:pic>
     </p:spTree>
   </p:cSld>
-  <p:timing>
-    <p:tnLst>
-      <p:par>
-        <p:cTn id="11" dur="indefinite" restart="never" nodeType="tmRoot">
-          <p:childTnLst>
-            <p:seq>
-              <p:cTn id="12" dur="indefinite" nodeType="mainSeq"/>
-              <p:prevCondLst>
-                <p:cond delay="0" evt="onPrev">
-                  <p:tgtEl>
-                    <p:sldTgt/>
-                  </p:tgtEl>
-                </p:cond>
-              </p:prevCondLst>
-              <p:nextCondLst>
-                <p:cond delay="0" evt="onNext">
-                  <p:tgtEl>
-                    <p:sldTgt/>
-                  </p:tgtEl>
-                </p:cond>
-              </p:nextCondLst>
-            </p:seq>
-          </p:childTnLst>
-        </p:cTn>
-      </p:par>
-    </p:tnLst>
-  </p:timing>
 </p:sld>
 </file>
 
@@ -5233,7 +5113,7 @@
       </p:grpSpPr>
       <p:sp>
         <p:nvSpPr>
-          <p:cNvPr id="96" name="TextShape 1"/>
+          <p:cNvPr id="99" name="TextShape 1"/>
           <p:cNvSpPr txBox="1"/>
           <p:nvPr/>
         </p:nvSpPr>
@@ -5274,7 +5154,7 @@
       </p:sp>
       <p:sp>
         <p:nvSpPr>
-          <p:cNvPr id="97" name="TextShape 2"/>
+          <p:cNvPr id="100" name="TextShape 2"/>
           <p:cNvSpPr txBox="1"/>
           <p:nvPr/>
         </p:nvSpPr>
@@ -5428,33 +5308,6 @@
       </p:sp>
     </p:spTree>
   </p:cSld>
-  <p:timing>
-    <p:tnLst>
-      <p:par>
-        <p:cTn id="13" dur="indefinite" restart="never" nodeType="tmRoot">
-          <p:childTnLst>
-            <p:seq>
-              <p:cTn id="14" dur="indefinite" nodeType="mainSeq"/>
-              <p:prevCondLst>
-                <p:cond delay="0" evt="onPrev">
-                  <p:tgtEl>
-                    <p:sldTgt/>
-                  </p:tgtEl>
-                </p:cond>
-              </p:prevCondLst>
-              <p:nextCondLst>
-                <p:cond delay="0" evt="onNext">
-                  <p:tgtEl>
-                    <p:sldTgt/>
-                  </p:tgtEl>
-                </p:cond>
-              </p:nextCondLst>
-            </p:seq>
-          </p:childTnLst>
-        </p:cTn>
-      </p:par>
-    </p:tnLst>
-  </p:timing>
 </p:sld>
 </file>
 
@@ -5477,7 +5330,7 @@
       </p:grpSpPr>
       <p:sp>
         <p:nvSpPr>
-          <p:cNvPr id="98" name="TextShape 1"/>
+          <p:cNvPr id="101" name="TextShape 1"/>
           <p:cNvSpPr txBox="1"/>
           <p:nvPr/>
         </p:nvSpPr>
@@ -5518,7 +5371,7 @@
       </p:sp>
       <p:sp>
         <p:nvSpPr>
-          <p:cNvPr id="99" name="TextShape 2"/>
+          <p:cNvPr id="102" name="TextShape 2"/>
           <p:cNvSpPr txBox="1"/>
           <p:nvPr/>
         </p:nvSpPr>
@@ -5787,33 +5640,6 @@
       </p:sp>
     </p:spTree>
   </p:cSld>
-  <p:timing>
-    <p:tnLst>
-      <p:par>
-        <p:cTn id="15" dur="indefinite" restart="never" nodeType="tmRoot">
-          <p:childTnLst>
-            <p:seq>
-              <p:cTn id="16" dur="indefinite" nodeType="mainSeq"/>
-              <p:prevCondLst>
-                <p:cond delay="0" evt="onPrev">
-                  <p:tgtEl>
-                    <p:sldTgt/>
-                  </p:tgtEl>
-                </p:cond>
-              </p:prevCondLst>
-              <p:nextCondLst>
-                <p:cond delay="0" evt="onNext">
-                  <p:tgtEl>
-                    <p:sldTgt/>
-                  </p:tgtEl>
-                </p:cond>
-              </p:nextCondLst>
-            </p:seq>
-          </p:childTnLst>
-        </p:cTn>
-      </p:par>
-    </p:tnLst>
-  </p:timing>
 </p:sld>
 </file>
 
@@ -5836,7 +5662,7 @@
       </p:grpSpPr>
       <p:sp>
         <p:nvSpPr>
-          <p:cNvPr id="100" name="TextShape 1"/>
+          <p:cNvPr id="103" name="TextShape 1"/>
           <p:cNvSpPr txBox="1"/>
           <p:nvPr/>
         </p:nvSpPr>
@@ -5877,7 +5703,7 @@
       </p:sp>
       <p:sp>
         <p:nvSpPr>
-          <p:cNvPr id="101" name="TextShape 2"/>
+          <p:cNvPr id="104" name="TextShape 2"/>
           <p:cNvSpPr txBox="1"/>
           <p:nvPr/>
         </p:nvSpPr>
@@ -6143,33 +5969,6 @@
       </p:sp>
     </p:spTree>
   </p:cSld>
-  <p:timing>
-    <p:tnLst>
-      <p:par>
-        <p:cTn id="17" dur="indefinite" restart="never" nodeType="tmRoot">
-          <p:childTnLst>
-            <p:seq>
-              <p:cTn id="18" dur="indefinite" nodeType="mainSeq"/>
-              <p:prevCondLst>
-                <p:cond delay="0" evt="onPrev">
-                  <p:tgtEl>
-                    <p:sldTgt/>
-                  </p:tgtEl>
-                </p:cond>
-              </p:prevCondLst>
-              <p:nextCondLst>
-                <p:cond delay="0" evt="onNext">
-                  <p:tgtEl>
-                    <p:sldTgt/>
-                  </p:tgtEl>
-                </p:cond>
-              </p:nextCondLst>
-            </p:seq>
-          </p:childTnLst>
-        </p:cTn>
-      </p:par>
-    </p:tnLst>
-  </p:timing>
 </p:sld>
 </file>
 

</xml_diff>